<commit_message>
Etude son flute et voix.
</commit_message>
<xml_diff>
--- a/Analyse spectrale_antoine.pptx
+++ b/Analyse spectrale_antoine.pptx
@@ -5,10 +5,10 @@
     <p:sldMasterId id="2147483648" r:id="rId2"/>
   </p:sldMasterIdLst>
   <p:notesMasterIdLst>
-    <p:notesMasterId r:id="rId18"/>
+    <p:notesMasterId r:id="rId19"/>
   </p:notesMasterIdLst>
   <p:handoutMasterIdLst>
-    <p:handoutMasterId r:id="rId19"/>
+    <p:handoutMasterId r:id="rId20"/>
   </p:handoutMasterIdLst>
   <p:sldIdLst>
     <p:sldId id="256" r:id="rId3"/>
@@ -19,13 +19,14 @@
     <p:sldId id="270" r:id="rId8"/>
     <p:sldId id="271" r:id="rId9"/>
     <p:sldId id="272" r:id="rId10"/>
-    <p:sldId id="259" r:id="rId11"/>
-    <p:sldId id="261" r:id="rId12"/>
-    <p:sldId id="262" r:id="rId13"/>
-    <p:sldId id="263" r:id="rId14"/>
-    <p:sldId id="264" r:id="rId15"/>
-    <p:sldId id="265" r:id="rId16"/>
-    <p:sldId id="266" r:id="rId17"/>
+    <p:sldId id="273" r:id="rId11"/>
+    <p:sldId id="259" r:id="rId12"/>
+    <p:sldId id="261" r:id="rId13"/>
+    <p:sldId id="262" r:id="rId14"/>
+    <p:sldId id="263" r:id="rId15"/>
+    <p:sldId id="264" r:id="rId16"/>
+    <p:sldId id="265" r:id="rId17"/>
+    <p:sldId id="266" r:id="rId18"/>
   </p:sldIdLst>
   <p:sldSz cx="12192000" cy="6858000"/>
   <p:notesSz cx="6858000" cy="9144000"/>
@@ -3851,7 +3852,7 @@
           <a:p>
             <a:fld id="{043B725B-653D-4166-A8E9-72A38A1847CF}" type="datetimeFigureOut">
               <a:rPr lang="es-ES"/>
-              <a:t>30/10/2014</a:t>
+              <a:t>03/11/2014</a:t>
             </a:fld>
             <a:endParaRPr/>
           </a:p>
@@ -4016,7 +4017,7 @@
           <a:p>
             <a:fld id="{783F64CD-0576-4A9A-BD06-7889D6E60BDC}" type="datetimeFigureOut">
               <a:rPr lang="es-ES"/>
-              <a:t>30/10/2014</a:t>
+              <a:t>03/11/2014</a:t>
             </a:fld>
             <a:endParaRPr/>
           </a:p>
@@ -4607,7 +4608,7 @@
           <a:p>
             <a:fld id="{37CC0096-1860-4642-9CD2-0079EA5E7CD1}" type="datetimeFigureOut">
               <a:rPr lang="es-ES"/>
-              <a:t>30/10/2014</a:t>
+              <a:t>03/11/2014</a:t>
             </a:fld>
             <a:endParaRPr/>
           </a:p>
@@ -4863,7 +4864,7 @@
           <a:p>
             <a:fld id="{37CC0096-1860-4642-9CD2-0079EA5E7CD1}" type="datetimeFigureOut">
               <a:rPr lang="es-ES"/>
-              <a:t>30/10/2014</a:t>
+              <a:t>03/11/2014</a:t>
             </a:fld>
             <a:endParaRPr/>
           </a:p>
@@ -5056,7 +5057,7 @@
           <a:p>
             <a:fld id="{37CC0096-1860-4642-9CD2-0079EA5E7CD1}" type="datetimeFigureOut">
               <a:rPr lang="es-ES"/>
-              <a:t>30/10/2014</a:t>
+              <a:t>03/11/2014</a:t>
             </a:fld>
             <a:endParaRPr/>
           </a:p>
@@ -5601,7 +5602,7 @@
           <a:p>
             <a:fld id="{37CC0096-1860-4642-9CD2-0079EA5E7CD1}" type="datetimeFigureOut">
               <a:rPr lang="es-ES"/>
-              <a:t>30/10/2014</a:t>
+              <a:t>03/11/2014</a:t>
             </a:fld>
             <a:endParaRPr/>
           </a:p>
@@ -6065,7 +6066,7 @@
           <a:p>
             <a:fld id="{37CC0096-1860-4642-9CD2-0079EA5E7CD1}" type="datetimeFigureOut">
               <a:rPr lang="es-ES"/>
-              <a:t>30/10/2014</a:t>
+              <a:t>03/11/2014</a:t>
             </a:fld>
             <a:endParaRPr/>
           </a:p>
@@ -6202,7 +6203,7 @@
           <a:p>
             <a:fld id="{37CC0096-1860-4642-9CD2-0079EA5E7CD1}" type="datetimeFigureOut">
               <a:rPr lang="es-ES"/>
-              <a:t>30/10/2014</a:t>
+              <a:t>03/11/2014</a:t>
             </a:fld>
             <a:endParaRPr/>
           </a:p>
@@ -6316,7 +6317,7 @@
           <a:p>
             <a:fld id="{37CC0096-1860-4642-9CD2-0079EA5E7CD1}" type="datetimeFigureOut">
               <a:rPr lang="es-ES"/>
-              <a:t>30/10/2014</a:t>
+              <a:t>03/11/2014</a:t>
             </a:fld>
             <a:endParaRPr/>
           </a:p>
@@ -7310,7 +7311,7 @@
             <a:fld id="{37CC0096-1860-4642-9CD2-0079EA5E7CD1}" type="datetimeFigureOut">
               <a:rPr lang="es-ES"/>
               <a:pPr/>
-              <a:t>30/10/2014</a:t>
+              <a:t>03/11/2014</a:t>
             </a:fld>
             <a:endParaRPr/>
           </a:p>
@@ -7979,48 +7980,116 @@
             <p:ph type="title"/>
           </p:nvPr>
         </p:nvSpPr>
-        <p:spPr/>
+        <p:spPr>
+          <a:xfrm>
+            <a:off x="1066800" y="99220"/>
+            <a:ext cx="10439400" cy="1325563"/>
+          </a:xfrm>
+        </p:spPr>
         <p:txBody>
-          <a:bodyPr/>
+          <a:bodyPr>
+            <a:normAutofit/>
+          </a:bodyPr>
           <a:lstStyle/>
           <a:p>
             <a:r>
-              <a:rPr lang="fr-FR" noProof="1" smtClean="0"/>
-              <a:t>Commité </a:t>
-            </a:r>
-            <a:r>
-              <a:rPr lang="fr-FR" noProof="1" smtClean="0">
-                <a:sym typeface="Wingdings" panose="05000000000000000000" pitchFamily="2" charset="2"/>
-              </a:rPr>
-              <a:t></a:t>
-            </a:r>
-            <a:endParaRPr lang="fr-FR" noProof="1"/>
+              <a:rPr lang="fr-FR" dirty="0"/>
+              <a:t>Disposition deux contenus avec graphique </a:t>
+            </a:r>
+            <a:r>
+              <a:rPr lang="fr-FR" dirty="0" err="1"/>
+              <a:t>SmartArt</a:t>
+            </a:r>
+            <a:endParaRPr lang="fr-FR" dirty="0"/>
           </a:p>
         </p:txBody>
       </p:sp>
       <p:sp>
         <p:nvSpPr>
-          <p:cNvPr id="3" name="Espace réservé du texte 2"/>
+          <p:cNvPr id="3" name="Espace réservé du contenu 2"/>
           <p:cNvSpPr>
             <a:spLocks noGrp="1"/>
           </p:cNvSpPr>
           <p:nvPr>
-            <p:ph type="body" idx="1"/>
+            <p:ph sz="half" idx="1"/>
           </p:nvPr>
         </p:nvSpPr>
         <p:spPr/>
         <p:txBody>
-          <a:bodyPr/>
+          <a:bodyPr>
+            <a:normAutofit/>
+          </a:bodyPr>
           <a:lstStyle/>
           <a:p>
-            <a:endParaRPr lang="fr-FR" noProof="1"/>
+            <a:pPr>
+              <a:buClr>
+                <a:schemeClr val="tx1">
+                  <a:lumMod val="75000"/>
+                </a:schemeClr>
+              </a:buClr>
+            </a:pPr>
+            <a:r>
+              <a:rPr lang="fr-FR" dirty="0"/>
+              <a:t>Texte de la première puce ici</a:t>
+            </a:r>
+          </a:p>
+          <a:p>
+            <a:pPr>
+              <a:buClr>
+                <a:schemeClr val="tx1">
+                  <a:lumMod val="75000"/>
+                </a:schemeClr>
+              </a:buClr>
+            </a:pPr>
+            <a:r>
+              <a:rPr lang="fr-FR" dirty="0"/>
+              <a:t>Texte de la deuxième puce ici</a:t>
+            </a:r>
+          </a:p>
+          <a:p>
+            <a:pPr>
+              <a:buClr>
+                <a:schemeClr val="tx1">
+                  <a:lumMod val="75000"/>
+                </a:schemeClr>
+              </a:buClr>
+            </a:pPr>
+            <a:r>
+              <a:rPr lang="fr-FR" dirty="0"/>
+              <a:t>Texte de la troisième puce ici</a:t>
+            </a:r>
           </a:p>
         </p:txBody>
       </p:sp>
+      <p:graphicFrame>
+        <p:nvGraphicFramePr>
+          <p:cNvPr id="7" name="Espace réservé du contenu 6" descr="Processus segmenté" title="SmartArt"/>
+          <p:cNvGraphicFramePr>
+            <a:graphicFrameLocks noGrp="1"/>
+          </p:cNvGraphicFramePr>
+          <p:nvPr>
+            <p:ph sz="half" idx="2"/>
+            <p:extLst>
+              <p:ext uri="{D42A27DB-BD31-4B8C-83A1-F6EECF244321}">
+                <p14:modId xmlns:p14="http://schemas.microsoft.com/office/powerpoint/2010/main" val="3312862639"/>
+              </p:ext>
+            </p:extLst>
+          </p:nvPr>
+        </p:nvGraphicFramePr>
+        <p:xfrm>
+          <a:off x="6324600" y="1825625"/>
+          <a:ext cx="5334000" cy="4575175"/>
+        </p:xfrm>
+        <a:graphic>
+          <a:graphicData uri="http://schemas.openxmlformats.org/drawingml/2006/diagram">
+            <dgm:relIds xmlns:dgm="http://schemas.openxmlformats.org/drawingml/2006/diagram" xmlns:r="http://schemas.openxmlformats.org/officeDocument/2006/relationships" r:dm="rId2" r:lo="rId3" r:qs="rId4" r:cs="rId5"/>
+          </a:graphicData>
+        </a:graphic>
+      </p:graphicFrame>
     </p:spTree>
     <p:extLst>
       <p:ext uri="{BB962C8B-B14F-4D97-AF65-F5344CB8AC3E}">
-        <p14:creationId xmlns:p14="http://schemas.microsoft.com/office/powerpoint/2010/main" val="3537718460"/>
+        <p14:creationId xmlns:p14="http://schemas.microsoft.com/office/powerpoint/2010/main" val="3948826341"/>
       </p:ext>
     </p:extLst>
   </p:cSld>
@@ -8081,6 +8150,16 @@
           <a:bodyPr/>
           <a:lstStyle/>
           <a:p>
+            <a:r>
+              <a:rPr lang="fr-FR" noProof="1" smtClean="0"/>
+              <a:t>Commité </a:t>
+            </a:r>
+            <a:r>
+              <a:rPr lang="fr-FR" noProof="1" smtClean="0">
+                <a:sym typeface="Wingdings" panose="05000000000000000000" pitchFamily="2" charset="2"/>
+              </a:rPr>
+              <a:t></a:t>
+            </a:r>
             <a:endParaRPr lang="fr-FR" noProof="1"/>
           </a:p>
         </p:txBody>
@@ -8104,67 +8183,10 @@
           </a:p>
         </p:txBody>
       </p:sp>
-      <p:sp>
-        <p:nvSpPr>
-          <p:cNvPr id="4" name="Espace réservé du contenu 3"/>
-          <p:cNvSpPr>
-            <a:spLocks noGrp="1"/>
-          </p:cNvSpPr>
-          <p:nvPr>
-            <p:ph sz="half" idx="2"/>
-          </p:nvPr>
-        </p:nvSpPr>
-        <p:spPr/>
-        <p:txBody>
-          <a:bodyPr/>
-          <a:lstStyle/>
-          <a:p>
-            <a:endParaRPr lang="fr-FR" noProof="1"/>
-          </a:p>
-        </p:txBody>
-      </p:sp>
-      <p:sp>
-        <p:nvSpPr>
-          <p:cNvPr id="5" name="Espace réservé du texte 4"/>
-          <p:cNvSpPr>
-            <a:spLocks noGrp="1"/>
-          </p:cNvSpPr>
-          <p:nvPr>
-            <p:ph type="body" sz="quarter" idx="3"/>
-          </p:nvPr>
-        </p:nvSpPr>
-        <p:spPr/>
-        <p:txBody>
-          <a:bodyPr/>
-          <a:lstStyle/>
-          <a:p>
-            <a:endParaRPr lang="fr-FR" noProof="1"/>
-          </a:p>
-        </p:txBody>
-      </p:sp>
-      <p:sp>
-        <p:nvSpPr>
-          <p:cNvPr id="6" name="Espace réservé du contenu 5"/>
-          <p:cNvSpPr>
-            <a:spLocks noGrp="1"/>
-          </p:cNvSpPr>
-          <p:nvPr>
-            <p:ph sz="quarter" idx="4"/>
-          </p:nvPr>
-        </p:nvSpPr>
-        <p:spPr/>
-        <p:txBody>
-          <a:bodyPr/>
-          <a:lstStyle/>
-          <a:p>
-            <a:endParaRPr lang="fr-FR" noProof="1"/>
-          </a:p>
-        </p:txBody>
-      </p:sp>
     </p:spTree>
     <p:extLst>
       <p:ext uri="{BB962C8B-B14F-4D97-AF65-F5344CB8AC3E}">
-        <p14:creationId xmlns:p14="http://schemas.microsoft.com/office/powerpoint/2010/main" val="2637673684"/>
+        <p14:creationId xmlns:p14="http://schemas.microsoft.com/office/powerpoint/2010/main" val="3537718460"/>
       </p:ext>
     </p:extLst>
   </p:cSld>
@@ -8229,6 +8251,150 @@
           </a:p>
         </p:txBody>
       </p:sp>
+      <p:sp>
+        <p:nvSpPr>
+          <p:cNvPr id="3" name="Espace réservé du texte 2"/>
+          <p:cNvSpPr>
+            <a:spLocks noGrp="1"/>
+          </p:cNvSpPr>
+          <p:nvPr>
+            <p:ph type="body" idx="1"/>
+          </p:nvPr>
+        </p:nvSpPr>
+        <p:spPr/>
+        <p:txBody>
+          <a:bodyPr/>
+          <a:lstStyle/>
+          <a:p>
+            <a:endParaRPr lang="fr-FR" noProof="1"/>
+          </a:p>
+        </p:txBody>
+      </p:sp>
+      <p:sp>
+        <p:nvSpPr>
+          <p:cNvPr id="4" name="Espace réservé du contenu 3"/>
+          <p:cNvSpPr>
+            <a:spLocks noGrp="1"/>
+          </p:cNvSpPr>
+          <p:nvPr>
+            <p:ph sz="half" idx="2"/>
+          </p:nvPr>
+        </p:nvSpPr>
+        <p:spPr/>
+        <p:txBody>
+          <a:bodyPr/>
+          <a:lstStyle/>
+          <a:p>
+            <a:endParaRPr lang="fr-FR" noProof="1"/>
+          </a:p>
+        </p:txBody>
+      </p:sp>
+      <p:sp>
+        <p:nvSpPr>
+          <p:cNvPr id="5" name="Espace réservé du texte 4"/>
+          <p:cNvSpPr>
+            <a:spLocks noGrp="1"/>
+          </p:cNvSpPr>
+          <p:nvPr>
+            <p:ph type="body" sz="quarter" idx="3"/>
+          </p:nvPr>
+        </p:nvSpPr>
+        <p:spPr/>
+        <p:txBody>
+          <a:bodyPr/>
+          <a:lstStyle/>
+          <a:p>
+            <a:endParaRPr lang="fr-FR" noProof="1"/>
+          </a:p>
+        </p:txBody>
+      </p:sp>
+      <p:sp>
+        <p:nvSpPr>
+          <p:cNvPr id="6" name="Espace réservé du contenu 5"/>
+          <p:cNvSpPr>
+            <a:spLocks noGrp="1"/>
+          </p:cNvSpPr>
+          <p:nvPr>
+            <p:ph sz="quarter" idx="4"/>
+          </p:nvPr>
+        </p:nvSpPr>
+        <p:spPr/>
+        <p:txBody>
+          <a:bodyPr/>
+          <a:lstStyle/>
+          <a:p>
+            <a:endParaRPr lang="fr-FR" noProof="1"/>
+          </a:p>
+        </p:txBody>
+      </p:sp>
+    </p:spTree>
+    <p:extLst>
+      <p:ext uri="{BB962C8B-B14F-4D97-AF65-F5344CB8AC3E}">
+        <p14:creationId xmlns:p14="http://schemas.microsoft.com/office/powerpoint/2010/main" val="2637673684"/>
+      </p:ext>
+    </p:extLst>
+  </p:cSld>
+  <p:clrMapOvr>
+    <a:masterClrMapping/>
+  </p:clrMapOvr>
+  <mc:AlternateContent xmlns:mc="http://schemas.openxmlformats.org/markup-compatibility/2006" xmlns:p14="http://schemas.microsoft.com/office/powerpoint/2010/main">
+    <mc:Choice Requires="p14">
+      <p:transition spd="med" p14:dur="700">
+        <p:fade/>
+      </p:transition>
+    </mc:Choice>
+    <mc:Fallback xmlns="">
+      <p:transition spd="med">
+        <p:fade/>
+      </p:transition>
+    </mc:Fallback>
+  </mc:AlternateContent>
+  <p:timing>
+    <p:tnLst>
+      <p:par>
+        <p:cTn id="1" dur="indefinite" restart="never" nodeType="tmRoot"/>
+      </p:par>
+    </p:tnLst>
+  </p:timing>
+</p:sld>
+</file>
+
+<file path=ppt/slides/slide13.xml><?xml version="1.0" encoding="utf-8"?>
+<p:sld xmlns:a="http://schemas.openxmlformats.org/drawingml/2006/main" xmlns:r="http://schemas.openxmlformats.org/officeDocument/2006/relationships" xmlns:p="http://schemas.openxmlformats.org/presentationml/2006/main">
+  <p:cSld>
+    <p:spTree>
+      <p:nvGrpSpPr>
+        <p:cNvPr id="1" name=""/>
+        <p:cNvGrpSpPr/>
+        <p:nvPr/>
+      </p:nvGrpSpPr>
+      <p:grpSpPr>
+        <a:xfrm>
+          <a:off x="0" y="0"/>
+          <a:ext cx="0" cy="0"/>
+          <a:chOff x="0" y="0"/>
+          <a:chExt cx="0" cy="0"/>
+        </a:xfrm>
+      </p:grpSpPr>
+      <p:sp>
+        <p:nvSpPr>
+          <p:cNvPr id="2" name="Titre 1"/>
+          <p:cNvSpPr>
+            <a:spLocks noGrp="1"/>
+          </p:cNvSpPr>
+          <p:nvPr>
+            <p:ph type="title"/>
+          </p:nvPr>
+        </p:nvSpPr>
+        <p:spPr/>
+        <p:txBody>
+          <a:bodyPr/>
+          <a:lstStyle/>
+          <a:p>
+            <a:endParaRPr lang="fr-FR" noProof="1"/>
+          </a:p>
+        </p:txBody>
+      </p:sp>
     </p:spTree>
     <p:extLst>
       <p:ext uri="{BB962C8B-B14F-4D97-AF65-F5344CB8AC3E}">
@@ -8261,7 +8427,7 @@
 </p:sld>
 </file>
 
-<file path=ppt/slides/slide13.xml><?xml version="1.0" encoding="utf-8"?>
+<file path=ppt/slides/slide14.xml><?xml version="1.0" encoding="utf-8"?>
 <p:sld xmlns:a="http://schemas.openxmlformats.org/drawingml/2006/main" xmlns:r="http://schemas.openxmlformats.org/officeDocument/2006/relationships" xmlns:p="http://schemas.openxmlformats.org/presentationml/2006/main">
   <p:cSld>
     <p:spTree>
@@ -8310,7 +8476,7 @@
 </p:sld>
 </file>
 
-<file path=ppt/slides/slide14.xml><?xml version="1.0" encoding="utf-8"?>
+<file path=ppt/slides/slide15.xml><?xml version="1.0" encoding="utf-8"?>
 <p:sld xmlns:a="http://schemas.openxmlformats.org/drawingml/2006/main" xmlns:r="http://schemas.openxmlformats.org/officeDocument/2006/relationships" xmlns:p="http://schemas.openxmlformats.org/presentationml/2006/main">
   <p:cSld>
     <p:spTree>
@@ -8416,7 +8582,7 @@
 </p:sld>
 </file>
 
-<file path=ppt/slides/slide15.xml><?xml version="1.0" encoding="utf-8"?>
+<file path=ppt/slides/slide16.xml><?xml version="1.0" encoding="utf-8"?>
 <p:sld xmlns:a="http://schemas.openxmlformats.org/drawingml/2006/main" xmlns:r="http://schemas.openxmlformats.org/officeDocument/2006/relationships" xmlns:p="http://schemas.openxmlformats.org/presentationml/2006/main">
   <p:cSld>
     <p:spTree>
@@ -8728,11 +8894,7 @@
           <a:p>
             <a:r>
               <a:rPr lang="fr-FR" dirty="0" smtClean="0"/>
-              <a:t>Méthode </a:t>
-            </a:r>
-            <a:r>
-              <a:rPr lang="fr-FR" dirty="0" smtClean="0"/>
-              <a:t>:</a:t>
+              <a:t>Méthode :</a:t>
             </a:r>
           </a:p>
           <a:p>
@@ -9167,8 +9329,8 @@
           </a:p>
         </p:txBody>
       </p:sp>
-      <mc:AlternateContent xmlns:mc="http://schemas.openxmlformats.org/markup-compatibility/2006">
-        <mc:Choice xmlns:a14="http://schemas.microsoft.com/office/drawing/2010/main" Requires="a14">
+      <mc:AlternateContent xmlns:mc="http://schemas.openxmlformats.org/markup-compatibility/2006" xmlns:a14="http://schemas.microsoft.com/office/drawing/2010/main">
+        <mc:Choice Requires="a14">
           <p:sp>
             <p:nvSpPr>
               <p:cNvPr id="9" name="ZoneTexte 8"/>
@@ -9262,7 +9424,7 @@
             </p:txBody>
           </p:sp>
         </mc:Choice>
-        <mc:Fallback>
+        <mc:Fallback xmlns="">
           <p:sp>
             <p:nvSpPr>
               <p:cNvPr id="9" name="ZoneTexte 8"/>
@@ -9572,7 +9734,6 @@
               <a:rPr lang="fr-FR" dirty="0" smtClean="0"/>
               <a:t>Estimation de la corrélation</a:t>
             </a:r>
-            <a:endParaRPr lang="fr-FR" dirty="0" smtClean="0"/>
           </a:p>
           <a:p>
             <a:pPr marL="285750" indent="-285750">
@@ -10454,7 +10615,7 @@
             </a:pPr>
             <a:r>
               <a:rPr lang="fr-FR" dirty="0" smtClean="0"/>
-              <a:t>Performances de l’algorithme (suite) :</a:t>
+              <a:t>Application sur signal réel :</a:t>
             </a:r>
             <a:endParaRPr lang="fr-FR" dirty="0"/>
           </a:p>
@@ -10500,38 +10661,6 @@
           </a:p>
         </p:txBody>
       </p:sp>
-      <p:pic>
-        <p:nvPicPr>
-          <p:cNvPr id="6" name="Image 5"/>
-          <p:cNvPicPr>
-            <a:picLocks noChangeAspect="1"/>
-          </p:cNvPicPr>
-          <p:nvPr/>
-        </p:nvPicPr>
-        <p:blipFill rotWithShape="1">
-          <a:blip r:embed="rId2">
-            <a:extLst>
-              <a:ext uri="{28A0092B-C50C-407E-A947-70E740481C1C}">
-                <a14:useLocalDpi xmlns:a14="http://schemas.microsoft.com/office/drawing/2010/main" val="0"/>
-              </a:ext>
-            </a:extLst>
-          </a:blip>
-          <a:srcRect l="10060" t="2913" r="7281" b="5712"/>
-          <a:stretch/>
-        </p:blipFill>
-        <p:spPr>
-          <a:xfrm>
-            <a:off x="3359695" y="2060848"/>
-            <a:ext cx="8441653" cy="4680520"/>
-          </a:xfrm>
-          <a:prstGeom prst="rect">
-            <a:avLst/>
-          </a:prstGeom>
-          <a:effectLst>
-            <a:softEdge rad="50800"/>
-          </a:effectLst>
-        </p:spPr>
-      </p:pic>
     </p:spTree>
     <p:extLst>
       <p:ext uri="{BB962C8B-B14F-4D97-AF65-F5344CB8AC3E}">
@@ -10591,12 +10720,7 @@
             <p:ph type="title"/>
           </p:nvPr>
         </p:nvSpPr>
-        <p:spPr>
-          <a:xfrm>
-            <a:off x="1066800" y="99220"/>
-            <a:ext cx="10439400" cy="1325563"/>
-          </a:xfrm>
-        </p:spPr>
+        <p:spPr/>
         <p:txBody>
           <a:bodyPr>
             <a:normAutofit/>
@@ -10604,12 +10728,8 @@
           <a:lstStyle/>
           <a:p>
             <a:r>
-              <a:rPr lang="fr-FR" dirty="0"/>
-              <a:t>Disposition deux contenus avec graphique </a:t>
-            </a:r>
-            <a:r>
-              <a:rPr lang="fr-FR" dirty="0" err="1"/>
-              <a:t>SmartArt</a:t>
+              <a:rPr lang="fr-FR" dirty="0" err="1" smtClean="0"/>
+              <a:t>Levinson-Durbin</a:t>
             </a:r>
             <a:endParaRPr lang="fr-FR" dirty="0"/>
           </a:p>
@@ -10625,7 +10745,12 @@
             <p:ph sz="half" idx="1"/>
           </p:nvPr>
         </p:nvSpPr>
-        <p:spPr/>
+        <p:spPr>
+          <a:xfrm>
+            <a:off x="1066800" y="1700808"/>
+            <a:ext cx="10573816" cy="4575175"/>
+          </a:xfrm>
+        </p:spPr>
         <p:txBody>
           <a:bodyPr>
             <a:normAutofit/>
@@ -10640,67 +10765,89 @@
               </a:buClr>
             </a:pPr>
             <a:r>
-              <a:rPr lang="fr-FR" dirty="0"/>
-              <a:t>Texte de la première puce ici</a:t>
-            </a:r>
-          </a:p>
-          <a:p>
-            <a:pPr>
-              <a:buClr>
-                <a:schemeClr val="tx1">
-                  <a:lumMod val="75000"/>
-                </a:schemeClr>
-              </a:buClr>
-            </a:pPr>
-            <a:r>
-              <a:rPr lang="fr-FR" dirty="0"/>
-              <a:t>Texte de la deuxième puce ici</a:t>
-            </a:r>
-          </a:p>
-          <a:p>
-            <a:pPr>
-              <a:buClr>
-                <a:schemeClr val="tx1">
-                  <a:lumMod val="75000"/>
-                </a:schemeClr>
-              </a:buClr>
-            </a:pPr>
-            <a:r>
-              <a:rPr lang="fr-FR" dirty="0"/>
-              <a:t>Texte de la troisième puce ici</a:t>
-            </a:r>
+              <a:rPr lang="fr-FR" dirty="0" smtClean="0"/>
+              <a:t>Performances de l’algorithme (suite) :</a:t>
+            </a:r>
+            <a:endParaRPr lang="fr-FR" dirty="0"/>
           </a:p>
         </p:txBody>
       </p:sp>
-      <p:graphicFrame>
-        <p:nvGraphicFramePr>
-          <p:cNvPr id="7" name="Espace réservé du contenu 6" descr="Processus segmenté" title="SmartArt"/>
-          <p:cNvGraphicFramePr>
-            <a:graphicFrameLocks noGrp="1"/>
-          </p:cNvGraphicFramePr>
-          <p:nvPr>
-            <p:ph sz="half" idx="2"/>
-            <p:extLst>
-              <p:ext uri="{D42A27DB-BD31-4B8C-83A1-F6EECF244321}">
-                <p14:modId xmlns:p14="http://schemas.microsoft.com/office/powerpoint/2010/main" val="3312862639"/>
-              </p:ext>
-            </p:extLst>
-          </p:nvPr>
-        </p:nvGraphicFramePr>
-        <p:xfrm>
-          <a:off x="6324600" y="1825625"/>
-          <a:ext cx="5334000" cy="4575175"/>
-        </p:xfrm>
-        <a:graphic>
-          <a:graphicData uri="http://schemas.openxmlformats.org/drawingml/2006/diagram">
-            <dgm:relIds xmlns:dgm="http://schemas.openxmlformats.org/drawingml/2006/diagram" xmlns:r="http://schemas.openxmlformats.org/officeDocument/2006/relationships" r:dm="rId2" r:lo="rId3" r:qs="rId4" r:cs="rId5"/>
-          </a:graphicData>
-        </a:graphic>
-      </p:graphicFrame>
+      <p:sp>
+        <p:nvSpPr>
+          <p:cNvPr id="5" name="ZoneTexte 4"/>
+          <p:cNvSpPr txBox="1"/>
+          <p:nvPr/>
+        </p:nvSpPr>
+        <p:spPr>
+          <a:xfrm>
+            <a:off x="767408" y="4077072"/>
+            <a:ext cx="2694005" cy="646331"/>
+          </a:xfrm>
+          <a:prstGeom prst="rect">
+            <a:avLst/>
+          </a:prstGeom>
+          <a:noFill/>
+        </p:spPr>
+        <p:txBody>
+          <a:bodyPr wrap="square" rtlCol="0">
+            <a:spAutoFit/>
+          </a:bodyPr>
+          <a:lstStyle/>
+          <a:p>
+            <a:pPr marL="285750" indent="-285750" algn="ctr">
+              <a:buFontTx/>
+              <a:buChar char="-"/>
+            </a:pPr>
+            <a:r>
+              <a:rPr lang="fr-FR" dirty="0" smtClean="0"/>
+              <a:t>Amplitude variable :</a:t>
+            </a:r>
+          </a:p>
+          <a:p>
+            <a:pPr marL="285750" indent="-285750">
+              <a:buFontTx/>
+              <a:buChar char="-"/>
+            </a:pPr>
+            <a:endParaRPr lang="fr-FR" dirty="0" smtClean="0"/>
+          </a:p>
+        </p:txBody>
+      </p:sp>
+      <p:pic>
+        <p:nvPicPr>
+          <p:cNvPr id="6" name="Image 5"/>
+          <p:cNvPicPr>
+            <a:picLocks noChangeAspect="1"/>
+          </p:cNvPicPr>
+          <p:nvPr/>
+        </p:nvPicPr>
+        <p:blipFill rotWithShape="1">
+          <a:blip r:embed="rId2">
+            <a:extLst>
+              <a:ext uri="{28A0092B-C50C-407E-A947-70E740481C1C}">
+                <a14:useLocalDpi xmlns:a14="http://schemas.microsoft.com/office/drawing/2010/main" val="0"/>
+              </a:ext>
+            </a:extLst>
+          </a:blip>
+          <a:srcRect l="10060" t="2913" r="7281" b="5712"/>
+          <a:stretch/>
+        </p:blipFill>
+        <p:spPr>
+          <a:xfrm>
+            <a:off x="3359695" y="2060848"/>
+            <a:ext cx="8441653" cy="4680520"/>
+          </a:xfrm>
+          <a:prstGeom prst="rect">
+            <a:avLst/>
+          </a:prstGeom>
+          <a:effectLst>
+            <a:softEdge rad="50800"/>
+          </a:effectLst>
+        </p:spPr>
+      </p:pic>
     </p:spTree>
     <p:extLst>
       <p:ext uri="{BB962C8B-B14F-4D97-AF65-F5344CB8AC3E}">
-        <p14:creationId xmlns:p14="http://schemas.microsoft.com/office/powerpoint/2010/main" val="3948826341"/>
+        <p14:creationId xmlns:p14="http://schemas.microsoft.com/office/powerpoint/2010/main" val="569882389"/>
       </p:ext>
     </p:extLst>
   </p:cSld>

</xml_diff>